<commit_message>
slide_tools.py modified with correct json output and create_slide function
</commit_message>
<xml_diff>
--- a/output_presentation.pptx
+++ b/output_presentation.pptx
@@ -7,9 +7,6 @@
   <p:sldIdLst>
     <p:sldId id="256" r:id="rId7"/>
     <p:sldId id="257" r:id="rId8"/>
-    <p:sldId id="258" r:id="rId9"/>
-    <p:sldId id="259" r:id="rId10"/>
-    <p:sldId id="260" r:id="rId11"/>
   </p:sldIdLst>
   <p:sldSz cx="9144000" cy="6858000" type="screen4x3"/>
   <p:notesSz cx="6858000" cy="9144000"/>
@@ -3108,7 +3105,7 @@
           <a:lstStyle/>
           <a:p>
             <a:r>
-              <a:t>Welcome to the Presentation</a:t>
+              <a:t>Targeting Modern, Health-Conscious Young Women in China</a:t>
             </a:r>
           </a:p>
         </p:txBody>
@@ -3121,8 +3118,8 @@
         </p:nvSpPr>
         <p:spPr>
           <a:xfrm>
-            <a:off x="914400" y="1828800"/>
-            <a:ext cx="4572000" cy="1828800"/>
+            <a:off x="1097280" y="1554480"/>
+            <a:ext cx="4206240" cy="4206240"/>
           </a:xfrm>
           <a:prstGeom prst="rect">
             <a:avLst/>
@@ -3130,48 +3127,39 @@
           <a:noFill/>
         </p:spPr>
         <p:txBody>
-          <a:bodyPr wrap="none">
+          <a:bodyPr wrap="square">
             <a:spAutoFit/>
           </a:bodyPr>
           <a:lstStyle/>
           <a:p>
-            <a:r>
-              <a:t>This presentation is based on the contents of a document.</a:t>
-            </a:r>
-          </a:p>
-        </p:txBody>
-      </p:sp>
-      <p:sp>
-        <p:nvSpPr>
-          <p:cNvPr id="4" name="TextBox 3"/>
-          <p:cNvSpPr txBox="1"/>
-          <p:nvPr/>
-        </p:nvSpPr>
-        <p:spPr>
-          <a:xfrm>
-            <a:off x="914400" y="1828800"/>
-            <a:ext cx="4572000" cy="1828800"/>
-          </a:xfrm>
-          <a:prstGeom prst="rect">
-            <a:avLst/>
-          </a:prstGeom>
-          <a:noFill/>
-        </p:spPr>
-        <p:txBody>
-          <a:bodyPr wrap="none">
-            <a:spAutoFit/>
-          </a:bodyPr>
-          <a:lstStyle/>
-          <a:p>
-            <a:r>
-              <a:t>Please browse through the following slides for the content of the document.</a:t>
+            <a:pPr>
+              <a:defRPr sz="1600"/>
+            </a:pPr>
+            <a:r>
+              <a:t>• Developing products tailored to health and wellness trends</a:t>
+            </a:r>
+          </a:p>
+          <a:p>
+            <a:pPr>
+              <a:defRPr sz="1600"/>
+            </a:pPr>
+            <a:r>
+              <a:t>• Utilizing digital marketing channels to reach the target demographic</a:t>
+            </a:r>
+          </a:p>
+          <a:p>
+            <a:pPr>
+              <a:defRPr sz="1600"/>
+            </a:pPr>
+            <a:r>
+              <a:t>• Emphasizing natural ingredients and sustainability in product offerings</a:t>
             </a:r>
           </a:p>
         </p:txBody>
       </p:sp>
       <p:pic>
         <p:nvPicPr>
-          <p:cNvPr id="5" name="Picture 4" descr="yue_sai_logo.png"/>
+          <p:cNvPr id="4" name="Picture 3" descr="img_p0_1.png"/>
           <p:cNvPicPr>
             <a:picLocks noChangeAspect="1"/>
           </p:cNvPicPr>
@@ -3185,8 +3173,8 @@
         </p:blipFill>
         <p:spPr>
           <a:xfrm>
-            <a:off x="4572000" y="1371600"/>
-            <a:ext cx="3657600" cy="3657600"/>
+            <a:off x="5212080" y="1554480"/>
+            <a:ext cx="3291840" cy="2377440"/>
           </a:xfrm>
           <a:prstGeom prst="rect">
             <a:avLst/>
@@ -3227,7 +3215,7 @@
           <a:lstStyle/>
           <a:p>
             <a:r>
-              <a:t>Welcome to the Presentation</a:t>
+              <a:t>Yue Sai's Relevance Decline</a:t>
             </a:r>
           </a:p>
         </p:txBody>
@@ -3240,8 +3228,8 @@
         </p:nvSpPr>
         <p:spPr>
           <a:xfrm>
-            <a:off x="914400" y="1828800"/>
-            <a:ext cx="4572000" cy="1828800"/>
+            <a:off x="1097280" y="1554480"/>
+            <a:ext cx="4206240" cy="4206240"/>
           </a:xfrm>
           <a:prstGeom prst="rect">
             <a:avLst/>
@@ -3249,115 +3237,39 @@
           <a:noFill/>
         </p:spPr>
         <p:txBody>
-          <a:bodyPr wrap="none">
+          <a:bodyPr wrap="square">
             <a:spAutoFit/>
           </a:bodyPr>
           <a:lstStyle/>
           <a:p>
-            <a:r>
-              <a:t>It contains information about a beauty brand.</a:t>
-            </a:r>
-          </a:p>
-        </p:txBody>
-      </p:sp>
-    </p:spTree>
-  </p:cSld>
-  <p:clrMapOvr>
-    <a:masterClrMapping/>
-  </p:clrMapOvr>
-</p:sld>
-</file>
-
-<file path=ppt/slides/slide3.xml><?xml version="1.0" encoding="utf-8"?>
-<p:sld xmlns:a="http://schemas.openxmlformats.org/drawingml/2006/main" xmlns:p="http://schemas.openxmlformats.org/presentationml/2006/main" xmlns:r="http://schemas.openxmlformats.org/officeDocument/2006/relationships">
-  <p:cSld>
-    <p:spTree>
-      <p:nvGrpSpPr>
-        <p:cNvPr id="1" name=""/>
-        <p:cNvGrpSpPr/>
-        <p:nvPr/>
-      </p:nvGrpSpPr>
-      <p:grpSpPr/>
-      <p:sp>
-        <p:nvSpPr>
-          <p:cNvPr id="2" name="Title 1"/>
-          <p:cNvSpPr>
-            <a:spLocks noGrp="1"/>
-          </p:cNvSpPr>
-          <p:nvPr>
-            <p:ph type="title"/>
-          </p:nvPr>
-        </p:nvSpPr>
-        <p:spPr/>
-        <p:txBody>
-          <a:bodyPr/>
-          <a:lstStyle/>
-          <a:p>
-            <a:r>
-              <a:t>Page 1</a:t>
-            </a:r>
-          </a:p>
-        </p:txBody>
-      </p:sp>
-      <p:sp>
-        <p:nvSpPr>
-          <p:cNvPr id="3" name="TextBox 2"/>
-          <p:cNvSpPr txBox="1"/>
-          <p:nvPr/>
-        </p:nvSpPr>
-        <p:spPr>
-          <a:xfrm>
-            <a:off x="457200" y="1371600"/>
-            <a:ext cx="3657600" cy="1828800"/>
-          </a:xfrm>
-          <a:prstGeom prst="rect">
-            <a:avLst/>
-          </a:prstGeom>
-          <a:noFill/>
-        </p:spPr>
-        <p:txBody>
-          <a:bodyPr wrap="none">
-            <a:spAutoFit/>
-          </a:bodyPr>
-          <a:lstStyle/>
-          <a:p>
-            <a:r>
-              <a:t>Content for page 1</a:t>
-            </a:r>
-          </a:p>
-        </p:txBody>
-      </p:sp>
-      <p:sp>
-        <p:nvSpPr>
-          <p:cNvPr id="4" name="TextBox 3"/>
-          <p:cNvSpPr txBox="1"/>
-          <p:nvPr/>
-        </p:nvSpPr>
-        <p:spPr>
-          <a:xfrm>
-            <a:off x="914400" y="1828800"/>
-            <a:ext cx="4572000" cy="1828800"/>
-          </a:xfrm>
-          <a:prstGeom prst="rect">
-            <a:avLst/>
-          </a:prstGeom>
-          <a:noFill/>
-        </p:spPr>
-        <p:txBody>
-          <a:bodyPr wrap="none">
-            <a:spAutoFit/>
-          </a:bodyPr>
-          <a:lstStyle/>
-          <a:p>
-            <a:r>
-              <a:t>This is page 1 of the document.</a:t>
+            <a:pPr>
+              <a:defRPr sz="1800"/>
+            </a:pPr>
+            <a:r>
+              <a:t>• Multiple unsuccessful attempts to reposition the brand</a:t>
+            </a:r>
+          </a:p>
+          <a:p>
+            <a:pPr>
+              <a:defRPr sz="1800"/>
+            </a:pPr>
+            <a:r>
+              <a:t>• Failing to adapt to changing consumer preferences</a:t>
+            </a:r>
+          </a:p>
+          <a:p>
+            <a:pPr>
+              <a:defRPr sz="1800"/>
+            </a:pPr>
+            <a:r>
+              <a:t>• Losing market share to competitors with more innovative strategies</a:t>
             </a:r>
           </a:p>
         </p:txBody>
       </p:sp>
       <p:pic>
         <p:nvPicPr>
-          <p:cNvPr id="5" name="Picture 4" descr="yue_sai_logo.png"/>
+          <p:cNvPr id="4" name="Picture 3" descr="img_p0_2.png"/>
           <p:cNvPicPr>
             <a:picLocks noChangeAspect="1"/>
           </p:cNvPicPr>
@@ -3371,200 +3283,14 @@
         </p:blipFill>
         <p:spPr>
           <a:xfrm>
-            <a:off x="4572000" y="1371600"/>
-            <a:ext cx="3657600" cy="3657600"/>
+            <a:off x="5212080" y="1554480"/>
+            <a:ext cx="3291840" cy="2377440"/>
           </a:xfrm>
           <a:prstGeom prst="rect">
             <a:avLst/>
           </a:prstGeom>
         </p:spPr>
       </p:pic>
-    </p:spTree>
-  </p:cSld>
-  <p:clrMapOvr>
-    <a:masterClrMapping/>
-  </p:clrMapOvr>
-</p:sld>
-</file>
-
-<file path=ppt/slides/slide4.xml><?xml version="1.0" encoding="utf-8"?>
-<p:sld xmlns:a="http://schemas.openxmlformats.org/drawingml/2006/main" xmlns:p="http://schemas.openxmlformats.org/presentationml/2006/main" xmlns:r="http://schemas.openxmlformats.org/officeDocument/2006/relationships">
-  <p:cSld>
-    <p:spTree>
-      <p:nvGrpSpPr>
-        <p:cNvPr id="1" name=""/>
-        <p:cNvGrpSpPr/>
-        <p:nvPr/>
-      </p:nvGrpSpPr>
-      <p:grpSpPr/>
-      <p:sp>
-        <p:nvSpPr>
-          <p:cNvPr id="2" name="Title 1"/>
-          <p:cNvSpPr>
-            <a:spLocks noGrp="1"/>
-          </p:cNvSpPr>
-          <p:nvPr>
-            <p:ph type="title"/>
-          </p:nvPr>
-        </p:nvSpPr>
-        <p:spPr/>
-        <p:txBody>
-          <a:bodyPr/>
-          <a:lstStyle/>
-          <a:p>
-            <a:r>
-              <a:t>Page 2</a:t>
-            </a:r>
-          </a:p>
-        </p:txBody>
-      </p:sp>
-      <p:sp>
-        <p:nvSpPr>
-          <p:cNvPr id="3" name="TextBox 2"/>
-          <p:cNvSpPr txBox="1"/>
-          <p:nvPr/>
-        </p:nvSpPr>
-        <p:spPr>
-          <a:xfrm>
-            <a:off x="457200" y="1371600"/>
-            <a:ext cx="3657600" cy="1828800"/>
-          </a:xfrm>
-          <a:prstGeom prst="rect">
-            <a:avLst/>
-          </a:prstGeom>
-          <a:noFill/>
-        </p:spPr>
-        <p:txBody>
-          <a:bodyPr wrap="none">
-            <a:spAutoFit/>
-          </a:bodyPr>
-          <a:lstStyle/>
-          <a:p>
-            <a:r>
-              <a:t>This is the second page of the Presentation.</a:t>
-            </a:r>
-          </a:p>
-        </p:txBody>
-      </p:sp>
-      <p:sp>
-        <p:nvSpPr>
-          <p:cNvPr id="4" name="TextBox 3"/>
-          <p:cNvSpPr txBox="1"/>
-          <p:nvPr/>
-        </p:nvSpPr>
-        <p:spPr>
-          <a:xfrm>
-            <a:off x="914400" y="1828800"/>
-            <a:ext cx="4572000" cy="1828800"/>
-          </a:xfrm>
-          <a:prstGeom prst="rect">
-            <a:avLst/>
-          </a:prstGeom>
-          <a:noFill/>
-        </p:spPr>
-        <p:txBody>
-          <a:bodyPr wrap="none">
-            <a:spAutoFit/>
-          </a:bodyPr>
-          <a:lstStyle/>
-          <a:p>
-            <a:r>
-              <a:t>This is page 2 text.</a:t>
-            </a:r>
-          </a:p>
-        </p:txBody>
-      </p:sp>
-      <p:pic>
-        <p:nvPicPr>
-          <p:cNvPr id="5" name="Picture 4" descr="yue_sai_logo.png"/>
-          <p:cNvPicPr>
-            <a:picLocks noChangeAspect="1"/>
-          </p:cNvPicPr>
-          <p:nvPr/>
-        </p:nvPicPr>
-        <p:blipFill>
-          <a:blip r:embed="rId2"/>
-          <a:stretch>
-            <a:fillRect/>
-          </a:stretch>
-        </p:blipFill>
-        <p:spPr>
-          <a:xfrm>
-            <a:off x="4572000" y="1371600"/>
-            <a:ext cx="3657600" cy="3657600"/>
-          </a:xfrm>
-          <a:prstGeom prst="rect">
-            <a:avLst/>
-          </a:prstGeom>
-        </p:spPr>
-      </p:pic>
-    </p:spTree>
-  </p:cSld>
-  <p:clrMapOvr>
-    <a:masterClrMapping/>
-  </p:clrMapOvr>
-</p:sld>
-</file>
-
-<file path=ppt/slides/slide5.xml><?xml version="1.0" encoding="utf-8"?>
-<p:sld xmlns:a="http://schemas.openxmlformats.org/drawingml/2006/main" xmlns:p="http://schemas.openxmlformats.org/presentationml/2006/main" xmlns:r="http://schemas.openxmlformats.org/officeDocument/2006/relationships">
-  <p:cSld>
-    <p:spTree>
-      <p:nvGrpSpPr>
-        <p:cNvPr id="1" name=""/>
-        <p:cNvGrpSpPr/>
-        <p:nvPr/>
-      </p:nvGrpSpPr>
-      <p:grpSpPr/>
-      <p:sp>
-        <p:nvSpPr>
-          <p:cNvPr id="2" name="Title 1"/>
-          <p:cNvSpPr>
-            <a:spLocks noGrp="1"/>
-          </p:cNvSpPr>
-          <p:nvPr>
-            <p:ph type="title"/>
-          </p:nvPr>
-        </p:nvSpPr>
-        <p:spPr/>
-        <p:txBody>
-          <a:bodyPr/>
-          <a:lstStyle/>
-          <a:p>
-            <a:r>
-              <a:t>Page 3</a:t>
-            </a:r>
-          </a:p>
-        </p:txBody>
-      </p:sp>
-      <p:sp>
-        <p:nvSpPr>
-          <p:cNvPr id="3" name="TextBox 2"/>
-          <p:cNvSpPr txBox="1"/>
-          <p:nvPr/>
-        </p:nvSpPr>
-        <p:spPr>
-          <a:xfrm>
-            <a:off x="457200" y="1371600"/>
-            <a:ext cx="3657600" cy="1828800"/>
-          </a:xfrm>
-          <a:prstGeom prst="rect">
-            <a:avLst/>
-          </a:prstGeom>
-          <a:noFill/>
-        </p:spPr>
-        <p:txBody>
-          <a:bodyPr wrap="none">
-            <a:spAutoFit/>
-          </a:bodyPr>
-          <a:lstStyle/>
-          <a:p>
-            <a:r>
-              <a:t>This is the third page of the document.</a:t>
-            </a:r>
-          </a:p>
-        </p:txBody>
-      </p:sp>
     </p:spTree>
   </p:cSld>
   <p:clrMapOvr>

</xml_diff>

<commit_message>
Revert "slide_tools.py modified with correct json output and create_slide function"
This reverts commit bfd7a29ed8217e82852b087deaf0111d66b41b4c.
</commit_message>
<xml_diff>
--- a/output_presentation.pptx
+++ b/output_presentation.pptx
@@ -7,6 +7,9 @@
   <p:sldIdLst>
     <p:sldId id="256" r:id="rId7"/>
     <p:sldId id="257" r:id="rId8"/>
+    <p:sldId id="258" r:id="rId9"/>
+    <p:sldId id="259" r:id="rId10"/>
+    <p:sldId id="260" r:id="rId11"/>
   </p:sldIdLst>
   <p:sldSz cx="9144000" cy="6858000" type="screen4x3"/>
   <p:notesSz cx="6858000" cy="9144000"/>
@@ -3105,7 +3108,7 @@
           <a:lstStyle/>
           <a:p>
             <a:r>
-              <a:t>Targeting Modern, Health-Conscious Young Women in China</a:t>
+              <a:t>Welcome to the Presentation</a:t>
             </a:r>
           </a:p>
         </p:txBody>
@@ -3118,8 +3121,8 @@
         </p:nvSpPr>
         <p:spPr>
           <a:xfrm>
-            <a:off x="1097280" y="1554480"/>
-            <a:ext cx="4206240" cy="4206240"/>
+            <a:off x="914400" y="1828800"/>
+            <a:ext cx="4572000" cy="1828800"/>
           </a:xfrm>
           <a:prstGeom prst="rect">
             <a:avLst/>
@@ -3127,39 +3130,48 @@
           <a:noFill/>
         </p:spPr>
         <p:txBody>
-          <a:bodyPr wrap="square">
+          <a:bodyPr wrap="none">
             <a:spAutoFit/>
           </a:bodyPr>
           <a:lstStyle/>
           <a:p>
-            <a:pPr>
-              <a:defRPr sz="1600"/>
-            </a:pPr>
-            <a:r>
-              <a:t>• Developing products tailored to health and wellness trends</a:t>
-            </a:r>
-          </a:p>
-          <a:p>
-            <a:pPr>
-              <a:defRPr sz="1600"/>
-            </a:pPr>
-            <a:r>
-              <a:t>• Utilizing digital marketing channels to reach the target demographic</a:t>
-            </a:r>
-          </a:p>
-          <a:p>
-            <a:pPr>
-              <a:defRPr sz="1600"/>
-            </a:pPr>
-            <a:r>
-              <a:t>• Emphasizing natural ingredients and sustainability in product offerings</a:t>
+            <a:r>
+              <a:t>This presentation is based on the contents of a document.</a:t>
+            </a:r>
+          </a:p>
+        </p:txBody>
+      </p:sp>
+      <p:sp>
+        <p:nvSpPr>
+          <p:cNvPr id="4" name="TextBox 3"/>
+          <p:cNvSpPr txBox="1"/>
+          <p:nvPr/>
+        </p:nvSpPr>
+        <p:spPr>
+          <a:xfrm>
+            <a:off x="914400" y="1828800"/>
+            <a:ext cx="4572000" cy="1828800"/>
+          </a:xfrm>
+          <a:prstGeom prst="rect">
+            <a:avLst/>
+          </a:prstGeom>
+          <a:noFill/>
+        </p:spPr>
+        <p:txBody>
+          <a:bodyPr wrap="none">
+            <a:spAutoFit/>
+          </a:bodyPr>
+          <a:lstStyle/>
+          <a:p>
+            <a:r>
+              <a:t>Please browse through the following slides for the content of the document.</a:t>
             </a:r>
           </a:p>
         </p:txBody>
       </p:sp>
       <p:pic>
         <p:nvPicPr>
-          <p:cNvPr id="4" name="Picture 3" descr="img_p0_1.png"/>
+          <p:cNvPr id="5" name="Picture 4" descr="yue_sai_logo.png"/>
           <p:cNvPicPr>
             <a:picLocks noChangeAspect="1"/>
           </p:cNvPicPr>
@@ -3173,8 +3185,8 @@
         </p:blipFill>
         <p:spPr>
           <a:xfrm>
-            <a:off x="5212080" y="1554480"/>
-            <a:ext cx="3291840" cy="2377440"/>
+            <a:off x="4572000" y="1371600"/>
+            <a:ext cx="3657600" cy="3657600"/>
           </a:xfrm>
           <a:prstGeom prst="rect">
             <a:avLst/>
@@ -3215,7 +3227,7 @@
           <a:lstStyle/>
           <a:p>
             <a:r>
-              <a:t>Yue Sai's Relevance Decline</a:t>
+              <a:t>Welcome to the Presentation</a:t>
             </a:r>
           </a:p>
         </p:txBody>
@@ -3228,8 +3240,8 @@
         </p:nvSpPr>
         <p:spPr>
           <a:xfrm>
-            <a:off x="1097280" y="1554480"/>
-            <a:ext cx="4206240" cy="4206240"/>
+            <a:off x="914400" y="1828800"/>
+            <a:ext cx="4572000" cy="1828800"/>
           </a:xfrm>
           <a:prstGeom prst="rect">
             <a:avLst/>
@@ -3237,39 +3249,115 @@
           <a:noFill/>
         </p:spPr>
         <p:txBody>
-          <a:bodyPr wrap="square">
+          <a:bodyPr wrap="none">
             <a:spAutoFit/>
           </a:bodyPr>
           <a:lstStyle/>
           <a:p>
-            <a:pPr>
-              <a:defRPr sz="1800"/>
-            </a:pPr>
-            <a:r>
-              <a:t>• Multiple unsuccessful attempts to reposition the brand</a:t>
-            </a:r>
-          </a:p>
-          <a:p>
-            <a:pPr>
-              <a:defRPr sz="1800"/>
-            </a:pPr>
-            <a:r>
-              <a:t>• Failing to adapt to changing consumer preferences</a:t>
-            </a:r>
-          </a:p>
-          <a:p>
-            <a:pPr>
-              <a:defRPr sz="1800"/>
-            </a:pPr>
-            <a:r>
-              <a:t>• Losing market share to competitors with more innovative strategies</a:t>
+            <a:r>
+              <a:t>It contains information about a beauty brand.</a:t>
+            </a:r>
+          </a:p>
+        </p:txBody>
+      </p:sp>
+    </p:spTree>
+  </p:cSld>
+  <p:clrMapOvr>
+    <a:masterClrMapping/>
+  </p:clrMapOvr>
+</p:sld>
+</file>
+
+<file path=ppt/slides/slide3.xml><?xml version="1.0" encoding="utf-8"?>
+<p:sld xmlns:a="http://schemas.openxmlformats.org/drawingml/2006/main" xmlns:p="http://schemas.openxmlformats.org/presentationml/2006/main" xmlns:r="http://schemas.openxmlformats.org/officeDocument/2006/relationships">
+  <p:cSld>
+    <p:spTree>
+      <p:nvGrpSpPr>
+        <p:cNvPr id="1" name=""/>
+        <p:cNvGrpSpPr/>
+        <p:nvPr/>
+      </p:nvGrpSpPr>
+      <p:grpSpPr/>
+      <p:sp>
+        <p:nvSpPr>
+          <p:cNvPr id="2" name="Title 1"/>
+          <p:cNvSpPr>
+            <a:spLocks noGrp="1"/>
+          </p:cNvSpPr>
+          <p:nvPr>
+            <p:ph type="title"/>
+          </p:nvPr>
+        </p:nvSpPr>
+        <p:spPr/>
+        <p:txBody>
+          <a:bodyPr/>
+          <a:lstStyle/>
+          <a:p>
+            <a:r>
+              <a:t>Page 1</a:t>
+            </a:r>
+          </a:p>
+        </p:txBody>
+      </p:sp>
+      <p:sp>
+        <p:nvSpPr>
+          <p:cNvPr id="3" name="TextBox 2"/>
+          <p:cNvSpPr txBox="1"/>
+          <p:nvPr/>
+        </p:nvSpPr>
+        <p:spPr>
+          <a:xfrm>
+            <a:off x="457200" y="1371600"/>
+            <a:ext cx="3657600" cy="1828800"/>
+          </a:xfrm>
+          <a:prstGeom prst="rect">
+            <a:avLst/>
+          </a:prstGeom>
+          <a:noFill/>
+        </p:spPr>
+        <p:txBody>
+          <a:bodyPr wrap="none">
+            <a:spAutoFit/>
+          </a:bodyPr>
+          <a:lstStyle/>
+          <a:p>
+            <a:r>
+              <a:t>Content for page 1</a:t>
+            </a:r>
+          </a:p>
+        </p:txBody>
+      </p:sp>
+      <p:sp>
+        <p:nvSpPr>
+          <p:cNvPr id="4" name="TextBox 3"/>
+          <p:cNvSpPr txBox="1"/>
+          <p:nvPr/>
+        </p:nvSpPr>
+        <p:spPr>
+          <a:xfrm>
+            <a:off x="914400" y="1828800"/>
+            <a:ext cx="4572000" cy="1828800"/>
+          </a:xfrm>
+          <a:prstGeom prst="rect">
+            <a:avLst/>
+          </a:prstGeom>
+          <a:noFill/>
+        </p:spPr>
+        <p:txBody>
+          <a:bodyPr wrap="none">
+            <a:spAutoFit/>
+          </a:bodyPr>
+          <a:lstStyle/>
+          <a:p>
+            <a:r>
+              <a:t>This is page 1 of the document.</a:t>
             </a:r>
           </a:p>
         </p:txBody>
       </p:sp>
       <p:pic>
         <p:nvPicPr>
-          <p:cNvPr id="4" name="Picture 3" descr="img_p0_2.png"/>
+          <p:cNvPr id="5" name="Picture 4" descr="yue_sai_logo.png"/>
           <p:cNvPicPr>
             <a:picLocks noChangeAspect="1"/>
           </p:cNvPicPr>
@@ -3283,14 +3371,200 @@
         </p:blipFill>
         <p:spPr>
           <a:xfrm>
-            <a:off x="5212080" y="1554480"/>
-            <a:ext cx="3291840" cy="2377440"/>
+            <a:off x="4572000" y="1371600"/>
+            <a:ext cx="3657600" cy="3657600"/>
           </a:xfrm>
           <a:prstGeom prst="rect">
             <a:avLst/>
           </a:prstGeom>
         </p:spPr>
       </p:pic>
+    </p:spTree>
+  </p:cSld>
+  <p:clrMapOvr>
+    <a:masterClrMapping/>
+  </p:clrMapOvr>
+</p:sld>
+</file>
+
+<file path=ppt/slides/slide4.xml><?xml version="1.0" encoding="utf-8"?>
+<p:sld xmlns:a="http://schemas.openxmlformats.org/drawingml/2006/main" xmlns:p="http://schemas.openxmlformats.org/presentationml/2006/main" xmlns:r="http://schemas.openxmlformats.org/officeDocument/2006/relationships">
+  <p:cSld>
+    <p:spTree>
+      <p:nvGrpSpPr>
+        <p:cNvPr id="1" name=""/>
+        <p:cNvGrpSpPr/>
+        <p:nvPr/>
+      </p:nvGrpSpPr>
+      <p:grpSpPr/>
+      <p:sp>
+        <p:nvSpPr>
+          <p:cNvPr id="2" name="Title 1"/>
+          <p:cNvSpPr>
+            <a:spLocks noGrp="1"/>
+          </p:cNvSpPr>
+          <p:nvPr>
+            <p:ph type="title"/>
+          </p:nvPr>
+        </p:nvSpPr>
+        <p:spPr/>
+        <p:txBody>
+          <a:bodyPr/>
+          <a:lstStyle/>
+          <a:p>
+            <a:r>
+              <a:t>Page 2</a:t>
+            </a:r>
+          </a:p>
+        </p:txBody>
+      </p:sp>
+      <p:sp>
+        <p:nvSpPr>
+          <p:cNvPr id="3" name="TextBox 2"/>
+          <p:cNvSpPr txBox="1"/>
+          <p:nvPr/>
+        </p:nvSpPr>
+        <p:spPr>
+          <a:xfrm>
+            <a:off x="457200" y="1371600"/>
+            <a:ext cx="3657600" cy="1828800"/>
+          </a:xfrm>
+          <a:prstGeom prst="rect">
+            <a:avLst/>
+          </a:prstGeom>
+          <a:noFill/>
+        </p:spPr>
+        <p:txBody>
+          <a:bodyPr wrap="none">
+            <a:spAutoFit/>
+          </a:bodyPr>
+          <a:lstStyle/>
+          <a:p>
+            <a:r>
+              <a:t>This is the second page of the Presentation.</a:t>
+            </a:r>
+          </a:p>
+        </p:txBody>
+      </p:sp>
+      <p:sp>
+        <p:nvSpPr>
+          <p:cNvPr id="4" name="TextBox 3"/>
+          <p:cNvSpPr txBox="1"/>
+          <p:nvPr/>
+        </p:nvSpPr>
+        <p:spPr>
+          <a:xfrm>
+            <a:off x="914400" y="1828800"/>
+            <a:ext cx="4572000" cy="1828800"/>
+          </a:xfrm>
+          <a:prstGeom prst="rect">
+            <a:avLst/>
+          </a:prstGeom>
+          <a:noFill/>
+        </p:spPr>
+        <p:txBody>
+          <a:bodyPr wrap="none">
+            <a:spAutoFit/>
+          </a:bodyPr>
+          <a:lstStyle/>
+          <a:p>
+            <a:r>
+              <a:t>This is page 2 text.</a:t>
+            </a:r>
+          </a:p>
+        </p:txBody>
+      </p:sp>
+      <p:pic>
+        <p:nvPicPr>
+          <p:cNvPr id="5" name="Picture 4" descr="yue_sai_logo.png"/>
+          <p:cNvPicPr>
+            <a:picLocks noChangeAspect="1"/>
+          </p:cNvPicPr>
+          <p:nvPr/>
+        </p:nvPicPr>
+        <p:blipFill>
+          <a:blip r:embed="rId2"/>
+          <a:stretch>
+            <a:fillRect/>
+          </a:stretch>
+        </p:blipFill>
+        <p:spPr>
+          <a:xfrm>
+            <a:off x="4572000" y="1371600"/>
+            <a:ext cx="3657600" cy="3657600"/>
+          </a:xfrm>
+          <a:prstGeom prst="rect">
+            <a:avLst/>
+          </a:prstGeom>
+        </p:spPr>
+      </p:pic>
+    </p:spTree>
+  </p:cSld>
+  <p:clrMapOvr>
+    <a:masterClrMapping/>
+  </p:clrMapOvr>
+</p:sld>
+</file>
+
+<file path=ppt/slides/slide5.xml><?xml version="1.0" encoding="utf-8"?>
+<p:sld xmlns:a="http://schemas.openxmlformats.org/drawingml/2006/main" xmlns:p="http://schemas.openxmlformats.org/presentationml/2006/main" xmlns:r="http://schemas.openxmlformats.org/officeDocument/2006/relationships">
+  <p:cSld>
+    <p:spTree>
+      <p:nvGrpSpPr>
+        <p:cNvPr id="1" name=""/>
+        <p:cNvGrpSpPr/>
+        <p:nvPr/>
+      </p:nvGrpSpPr>
+      <p:grpSpPr/>
+      <p:sp>
+        <p:nvSpPr>
+          <p:cNvPr id="2" name="Title 1"/>
+          <p:cNvSpPr>
+            <a:spLocks noGrp="1"/>
+          </p:cNvSpPr>
+          <p:nvPr>
+            <p:ph type="title"/>
+          </p:nvPr>
+        </p:nvSpPr>
+        <p:spPr/>
+        <p:txBody>
+          <a:bodyPr/>
+          <a:lstStyle/>
+          <a:p>
+            <a:r>
+              <a:t>Page 3</a:t>
+            </a:r>
+          </a:p>
+        </p:txBody>
+      </p:sp>
+      <p:sp>
+        <p:nvSpPr>
+          <p:cNvPr id="3" name="TextBox 2"/>
+          <p:cNvSpPr txBox="1"/>
+          <p:nvPr/>
+        </p:nvSpPr>
+        <p:spPr>
+          <a:xfrm>
+            <a:off x="457200" y="1371600"/>
+            <a:ext cx="3657600" cy="1828800"/>
+          </a:xfrm>
+          <a:prstGeom prst="rect">
+            <a:avLst/>
+          </a:prstGeom>
+          <a:noFill/>
+        </p:spPr>
+        <p:txBody>
+          <a:bodyPr wrap="none">
+            <a:spAutoFit/>
+          </a:bodyPr>
+          <a:lstStyle/>
+          <a:p>
+            <a:r>
+              <a:t>This is the third page of the document.</a:t>
+            </a:r>
+          </a:p>
+        </p:txBody>
+      </p:sp>
     </p:spTree>
   </p:cSld>
   <p:clrMapOvr>

</xml_diff>

<commit_message>
Reapply "slide_tools.py modified with correct json output and create_slide function"
This reverts commit a301506f38841b69699abc321659dc50d1251221.
</commit_message>
<xml_diff>
--- a/output_presentation.pptx
+++ b/output_presentation.pptx
@@ -7,9 +7,6 @@
   <p:sldIdLst>
     <p:sldId id="256" r:id="rId7"/>
     <p:sldId id="257" r:id="rId8"/>
-    <p:sldId id="258" r:id="rId9"/>
-    <p:sldId id="259" r:id="rId10"/>
-    <p:sldId id="260" r:id="rId11"/>
   </p:sldIdLst>
   <p:sldSz cx="9144000" cy="6858000" type="screen4x3"/>
   <p:notesSz cx="6858000" cy="9144000"/>
@@ -3108,7 +3105,7 @@
           <a:lstStyle/>
           <a:p>
             <a:r>
-              <a:t>Welcome to the Presentation</a:t>
+              <a:t>Targeting Modern, Health-Conscious Young Women in China</a:t>
             </a:r>
           </a:p>
         </p:txBody>
@@ -3121,8 +3118,8 @@
         </p:nvSpPr>
         <p:spPr>
           <a:xfrm>
-            <a:off x="914400" y="1828800"/>
-            <a:ext cx="4572000" cy="1828800"/>
+            <a:off x="1097280" y="1554480"/>
+            <a:ext cx="4206240" cy="4206240"/>
           </a:xfrm>
           <a:prstGeom prst="rect">
             <a:avLst/>
@@ -3130,48 +3127,39 @@
           <a:noFill/>
         </p:spPr>
         <p:txBody>
-          <a:bodyPr wrap="none">
+          <a:bodyPr wrap="square">
             <a:spAutoFit/>
           </a:bodyPr>
           <a:lstStyle/>
           <a:p>
-            <a:r>
-              <a:t>This presentation is based on the contents of a document.</a:t>
-            </a:r>
-          </a:p>
-        </p:txBody>
-      </p:sp>
-      <p:sp>
-        <p:nvSpPr>
-          <p:cNvPr id="4" name="TextBox 3"/>
-          <p:cNvSpPr txBox="1"/>
-          <p:nvPr/>
-        </p:nvSpPr>
-        <p:spPr>
-          <a:xfrm>
-            <a:off x="914400" y="1828800"/>
-            <a:ext cx="4572000" cy="1828800"/>
-          </a:xfrm>
-          <a:prstGeom prst="rect">
-            <a:avLst/>
-          </a:prstGeom>
-          <a:noFill/>
-        </p:spPr>
-        <p:txBody>
-          <a:bodyPr wrap="none">
-            <a:spAutoFit/>
-          </a:bodyPr>
-          <a:lstStyle/>
-          <a:p>
-            <a:r>
-              <a:t>Please browse through the following slides for the content of the document.</a:t>
+            <a:pPr>
+              <a:defRPr sz="1600"/>
+            </a:pPr>
+            <a:r>
+              <a:t>• Developing products tailored to health and wellness trends</a:t>
+            </a:r>
+          </a:p>
+          <a:p>
+            <a:pPr>
+              <a:defRPr sz="1600"/>
+            </a:pPr>
+            <a:r>
+              <a:t>• Utilizing digital marketing channels to reach the target demographic</a:t>
+            </a:r>
+          </a:p>
+          <a:p>
+            <a:pPr>
+              <a:defRPr sz="1600"/>
+            </a:pPr>
+            <a:r>
+              <a:t>• Emphasizing natural ingredients and sustainability in product offerings</a:t>
             </a:r>
           </a:p>
         </p:txBody>
       </p:sp>
       <p:pic>
         <p:nvPicPr>
-          <p:cNvPr id="5" name="Picture 4" descr="yue_sai_logo.png"/>
+          <p:cNvPr id="4" name="Picture 3" descr="img_p0_1.png"/>
           <p:cNvPicPr>
             <a:picLocks noChangeAspect="1"/>
           </p:cNvPicPr>
@@ -3185,8 +3173,8 @@
         </p:blipFill>
         <p:spPr>
           <a:xfrm>
-            <a:off x="4572000" y="1371600"/>
-            <a:ext cx="3657600" cy="3657600"/>
+            <a:off x="5212080" y="1554480"/>
+            <a:ext cx="3291840" cy="2377440"/>
           </a:xfrm>
           <a:prstGeom prst="rect">
             <a:avLst/>
@@ -3227,7 +3215,7 @@
           <a:lstStyle/>
           <a:p>
             <a:r>
-              <a:t>Welcome to the Presentation</a:t>
+              <a:t>Yue Sai's Relevance Decline</a:t>
             </a:r>
           </a:p>
         </p:txBody>
@@ -3240,8 +3228,8 @@
         </p:nvSpPr>
         <p:spPr>
           <a:xfrm>
-            <a:off x="914400" y="1828800"/>
-            <a:ext cx="4572000" cy="1828800"/>
+            <a:off x="1097280" y="1554480"/>
+            <a:ext cx="4206240" cy="4206240"/>
           </a:xfrm>
           <a:prstGeom prst="rect">
             <a:avLst/>
@@ -3249,115 +3237,39 @@
           <a:noFill/>
         </p:spPr>
         <p:txBody>
-          <a:bodyPr wrap="none">
+          <a:bodyPr wrap="square">
             <a:spAutoFit/>
           </a:bodyPr>
           <a:lstStyle/>
           <a:p>
-            <a:r>
-              <a:t>It contains information about a beauty brand.</a:t>
-            </a:r>
-          </a:p>
-        </p:txBody>
-      </p:sp>
-    </p:spTree>
-  </p:cSld>
-  <p:clrMapOvr>
-    <a:masterClrMapping/>
-  </p:clrMapOvr>
-</p:sld>
-</file>
-
-<file path=ppt/slides/slide3.xml><?xml version="1.0" encoding="utf-8"?>
-<p:sld xmlns:a="http://schemas.openxmlformats.org/drawingml/2006/main" xmlns:p="http://schemas.openxmlformats.org/presentationml/2006/main" xmlns:r="http://schemas.openxmlformats.org/officeDocument/2006/relationships">
-  <p:cSld>
-    <p:spTree>
-      <p:nvGrpSpPr>
-        <p:cNvPr id="1" name=""/>
-        <p:cNvGrpSpPr/>
-        <p:nvPr/>
-      </p:nvGrpSpPr>
-      <p:grpSpPr/>
-      <p:sp>
-        <p:nvSpPr>
-          <p:cNvPr id="2" name="Title 1"/>
-          <p:cNvSpPr>
-            <a:spLocks noGrp="1"/>
-          </p:cNvSpPr>
-          <p:nvPr>
-            <p:ph type="title"/>
-          </p:nvPr>
-        </p:nvSpPr>
-        <p:spPr/>
-        <p:txBody>
-          <a:bodyPr/>
-          <a:lstStyle/>
-          <a:p>
-            <a:r>
-              <a:t>Page 1</a:t>
-            </a:r>
-          </a:p>
-        </p:txBody>
-      </p:sp>
-      <p:sp>
-        <p:nvSpPr>
-          <p:cNvPr id="3" name="TextBox 2"/>
-          <p:cNvSpPr txBox="1"/>
-          <p:nvPr/>
-        </p:nvSpPr>
-        <p:spPr>
-          <a:xfrm>
-            <a:off x="457200" y="1371600"/>
-            <a:ext cx="3657600" cy="1828800"/>
-          </a:xfrm>
-          <a:prstGeom prst="rect">
-            <a:avLst/>
-          </a:prstGeom>
-          <a:noFill/>
-        </p:spPr>
-        <p:txBody>
-          <a:bodyPr wrap="none">
-            <a:spAutoFit/>
-          </a:bodyPr>
-          <a:lstStyle/>
-          <a:p>
-            <a:r>
-              <a:t>Content for page 1</a:t>
-            </a:r>
-          </a:p>
-        </p:txBody>
-      </p:sp>
-      <p:sp>
-        <p:nvSpPr>
-          <p:cNvPr id="4" name="TextBox 3"/>
-          <p:cNvSpPr txBox="1"/>
-          <p:nvPr/>
-        </p:nvSpPr>
-        <p:spPr>
-          <a:xfrm>
-            <a:off x="914400" y="1828800"/>
-            <a:ext cx="4572000" cy="1828800"/>
-          </a:xfrm>
-          <a:prstGeom prst="rect">
-            <a:avLst/>
-          </a:prstGeom>
-          <a:noFill/>
-        </p:spPr>
-        <p:txBody>
-          <a:bodyPr wrap="none">
-            <a:spAutoFit/>
-          </a:bodyPr>
-          <a:lstStyle/>
-          <a:p>
-            <a:r>
-              <a:t>This is page 1 of the document.</a:t>
+            <a:pPr>
+              <a:defRPr sz="1800"/>
+            </a:pPr>
+            <a:r>
+              <a:t>• Multiple unsuccessful attempts to reposition the brand</a:t>
+            </a:r>
+          </a:p>
+          <a:p>
+            <a:pPr>
+              <a:defRPr sz="1800"/>
+            </a:pPr>
+            <a:r>
+              <a:t>• Failing to adapt to changing consumer preferences</a:t>
+            </a:r>
+          </a:p>
+          <a:p>
+            <a:pPr>
+              <a:defRPr sz="1800"/>
+            </a:pPr>
+            <a:r>
+              <a:t>• Losing market share to competitors with more innovative strategies</a:t>
             </a:r>
           </a:p>
         </p:txBody>
       </p:sp>
       <p:pic>
         <p:nvPicPr>
-          <p:cNvPr id="5" name="Picture 4" descr="yue_sai_logo.png"/>
+          <p:cNvPr id="4" name="Picture 3" descr="img_p0_2.png"/>
           <p:cNvPicPr>
             <a:picLocks noChangeAspect="1"/>
           </p:cNvPicPr>
@@ -3371,200 +3283,14 @@
         </p:blipFill>
         <p:spPr>
           <a:xfrm>
-            <a:off x="4572000" y="1371600"/>
-            <a:ext cx="3657600" cy="3657600"/>
+            <a:off x="5212080" y="1554480"/>
+            <a:ext cx="3291840" cy="2377440"/>
           </a:xfrm>
           <a:prstGeom prst="rect">
             <a:avLst/>
           </a:prstGeom>
         </p:spPr>
       </p:pic>
-    </p:spTree>
-  </p:cSld>
-  <p:clrMapOvr>
-    <a:masterClrMapping/>
-  </p:clrMapOvr>
-</p:sld>
-</file>
-
-<file path=ppt/slides/slide4.xml><?xml version="1.0" encoding="utf-8"?>
-<p:sld xmlns:a="http://schemas.openxmlformats.org/drawingml/2006/main" xmlns:p="http://schemas.openxmlformats.org/presentationml/2006/main" xmlns:r="http://schemas.openxmlformats.org/officeDocument/2006/relationships">
-  <p:cSld>
-    <p:spTree>
-      <p:nvGrpSpPr>
-        <p:cNvPr id="1" name=""/>
-        <p:cNvGrpSpPr/>
-        <p:nvPr/>
-      </p:nvGrpSpPr>
-      <p:grpSpPr/>
-      <p:sp>
-        <p:nvSpPr>
-          <p:cNvPr id="2" name="Title 1"/>
-          <p:cNvSpPr>
-            <a:spLocks noGrp="1"/>
-          </p:cNvSpPr>
-          <p:nvPr>
-            <p:ph type="title"/>
-          </p:nvPr>
-        </p:nvSpPr>
-        <p:spPr/>
-        <p:txBody>
-          <a:bodyPr/>
-          <a:lstStyle/>
-          <a:p>
-            <a:r>
-              <a:t>Page 2</a:t>
-            </a:r>
-          </a:p>
-        </p:txBody>
-      </p:sp>
-      <p:sp>
-        <p:nvSpPr>
-          <p:cNvPr id="3" name="TextBox 2"/>
-          <p:cNvSpPr txBox="1"/>
-          <p:nvPr/>
-        </p:nvSpPr>
-        <p:spPr>
-          <a:xfrm>
-            <a:off x="457200" y="1371600"/>
-            <a:ext cx="3657600" cy="1828800"/>
-          </a:xfrm>
-          <a:prstGeom prst="rect">
-            <a:avLst/>
-          </a:prstGeom>
-          <a:noFill/>
-        </p:spPr>
-        <p:txBody>
-          <a:bodyPr wrap="none">
-            <a:spAutoFit/>
-          </a:bodyPr>
-          <a:lstStyle/>
-          <a:p>
-            <a:r>
-              <a:t>This is the second page of the Presentation.</a:t>
-            </a:r>
-          </a:p>
-        </p:txBody>
-      </p:sp>
-      <p:sp>
-        <p:nvSpPr>
-          <p:cNvPr id="4" name="TextBox 3"/>
-          <p:cNvSpPr txBox="1"/>
-          <p:nvPr/>
-        </p:nvSpPr>
-        <p:spPr>
-          <a:xfrm>
-            <a:off x="914400" y="1828800"/>
-            <a:ext cx="4572000" cy="1828800"/>
-          </a:xfrm>
-          <a:prstGeom prst="rect">
-            <a:avLst/>
-          </a:prstGeom>
-          <a:noFill/>
-        </p:spPr>
-        <p:txBody>
-          <a:bodyPr wrap="none">
-            <a:spAutoFit/>
-          </a:bodyPr>
-          <a:lstStyle/>
-          <a:p>
-            <a:r>
-              <a:t>This is page 2 text.</a:t>
-            </a:r>
-          </a:p>
-        </p:txBody>
-      </p:sp>
-      <p:pic>
-        <p:nvPicPr>
-          <p:cNvPr id="5" name="Picture 4" descr="yue_sai_logo.png"/>
-          <p:cNvPicPr>
-            <a:picLocks noChangeAspect="1"/>
-          </p:cNvPicPr>
-          <p:nvPr/>
-        </p:nvPicPr>
-        <p:blipFill>
-          <a:blip r:embed="rId2"/>
-          <a:stretch>
-            <a:fillRect/>
-          </a:stretch>
-        </p:blipFill>
-        <p:spPr>
-          <a:xfrm>
-            <a:off x="4572000" y="1371600"/>
-            <a:ext cx="3657600" cy="3657600"/>
-          </a:xfrm>
-          <a:prstGeom prst="rect">
-            <a:avLst/>
-          </a:prstGeom>
-        </p:spPr>
-      </p:pic>
-    </p:spTree>
-  </p:cSld>
-  <p:clrMapOvr>
-    <a:masterClrMapping/>
-  </p:clrMapOvr>
-</p:sld>
-</file>
-
-<file path=ppt/slides/slide5.xml><?xml version="1.0" encoding="utf-8"?>
-<p:sld xmlns:a="http://schemas.openxmlformats.org/drawingml/2006/main" xmlns:p="http://schemas.openxmlformats.org/presentationml/2006/main" xmlns:r="http://schemas.openxmlformats.org/officeDocument/2006/relationships">
-  <p:cSld>
-    <p:spTree>
-      <p:nvGrpSpPr>
-        <p:cNvPr id="1" name=""/>
-        <p:cNvGrpSpPr/>
-        <p:nvPr/>
-      </p:nvGrpSpPr>
-      <p:grpSpPr/>
-      <p:sp>
-        <p:nvSpPr>
-          <p:cNvPr id="2" name="Title 1"/>
-          <p:cNvSpPr>
-            <a:spLocks noGrp="1"/>
-          </p:cNvSpPr>
-          <p:nvPr>
-            <p:ph type="title"/>
-          </p:nvPr>
-        </p:nvSpPr>
-        <p:spPr/>
-        <p:txBody>
-          <a:bodyPr/>
-          <a:lstStyle/>
-          <a:p>
-            <a:r>
-              <a:t>Page 3</a:t>
-            </a:r>
-          </a:p>
-        </p:txBody>
-      </p:sp>
-      <p:sp>
-        <p:nvSpPr>
-          <p:cNvPr id="3" name="TextBox 2"/>
-          <p:cNvSpPr txBox="1"/>
-          <p:nvPr/>
-        </p:nvSpPr>
-        <p:spPr>
-          <a:xfrm>
-            <a:off x="457200" y="1371600"/>
-            <a:ext cx="3657600" cy="1828800"/>
-          </a:xfrm>
-          <a:prstGeom prst="rect">
-            <a:avLst/>
-          </a:prstGeom>
-          <a:noFill/>
-        </p:spPr>
-        <p:txBody>
-          <a:bodyPr wrap="none">
-            <a:spAutoFit/>
-          </a:bodyPr>
-          <a:lstStyle/>
-          <a:p>
-            <a:r>
-              <a:t>This is the third page of the document.</a:t>
-            </a:r>
-          </a:p>
-        </p:txBody>
-      </p:sp>
     </p:spTree>
   </p:cSld>
   <p:clrMapOvr>

</xml_diff>

<commit_message>
slide_tools modified to work with layouts
</commit_message>
<xml_diff>
--- a/output_presentation.pptx
+++ b/output_presentation.pptx
@@ -7,6 +7,7 @@
   <p:sldIdLst>
     <p:sldId id="256" r:id="rId7"/>
     <p:sldId id="257" r:id="rId8"/>
+    <p:sldId id="258" r:id="rId9"/>
   </p:sldIdLst>
   <p:sldSz cx="9144000" cy="6858000" type="screen4x3"/>
   <p:notesSz cx="6858000" cy="9144000"/>
@@ -3096,91 +3097,37 @@
             <a:spLocks noGrp="1"/>
           </p:cNvSpPr>
           <p:nvPr>
-            <p:ph type="title"/>
-          </p:nvPr>
-        </p:nvSpPr>
-        <p:spPr/>
-        <p:txBody>
-          <a:bodyPr/>
-          <a:lstStyle/>
-          <a:p>
-            <a:r>
-              <a:t>Targeting Modern, Health-Conscious Young Women in China</a:t>
-            </a:r>
-          </a:p>
-        </p:txBody>
-      </p:sp>
-      <p:sp>
-        <p:nvSpPr>
-          <p:cNvPr id="3" name="TextBox 2"/>
-          <p:cNvSpPr txBox="1"/>
-          <p:nvPr/>
-        </p:nvSpPr>
-        <p:spPr>
-          <a:xfrm>
-            <a:off x="1097280" y="1554480"/>
-            <a:ext cx="4206240" cy="4206240"/>
-          </a:xfrm>
-          <a:prstGeom prst="rect">
-            <a:avLst/>
-          </a:prstGeom>
-          <a:noFill/>
-        </p:spPr>
-        <p:txBody>
-          <a:bodyPr wrap="square">
-            <a:spAutoFit/>
-          </a:bodyPr>
-          <a:lstStyle/>
-          <a:p>
-            <a:pPr>
-              <a:defRPr sz="1600"/>
-            </a:pPr>
-            <a:r>
-              <a:t>• Developing products tailored to health and wellness trends</a:t>
-            </a:r>
-          </a:p>
-          <a:p>
-            <a:pPr>
-              <a:defRPr sz="1600"/>
-            </a:pPr>
-            <a:r>
-              <a:t>• Utilizing digital marketing channels to reach the target demographic</a:t>
-            </a:r>
-          </a:p>
-          <a:p>
-            <a:pPr>
-              <a:defRPr sz="1600"/>
-            </a:pPr>
-            <a:r>
-              <a:t>• Emphasizing natural ingredients and sustainability in product offerings</a:t>
-            </a:r>
-          </a:p>
-        </p:txBody>
-      </p:sp>
-      <p:pic>
-        <p:nvPicPr>
-          <p:cNvPr id="4" name="Picture 3" descr="img_p0_1.png"/>
-          <p:cNvPicPr>
-            <a:picLocks noChangeAspect="1"/>
-          </p:cNvPicPr>
-          <p:nvPr/>
-        </p:nvPicPr>
-        <p:blipFill>
-          <a:blip r:embed="rId2"/>
-          <a:stretch>
-            <a:fillRect/>
-          </a:stretch>
-        </p:blipFill>
-        <p:spPr>
-          <a:xfrm>
-            <a:off x="5212080" y="1554480"/>
-            <a:ext cx="3291840" cy="2377440"/>
-          </a:xfrm>
-          <a:prstGeom prst="rect">
-            <a:avLst/>
-          </a:prstGeom>
-        </p:spPr>
-      </p:pic>
+            <p:ph type="ctrTitle"/>
+          </p:nvPr>
+        </p:nvSpPr>
+        <p:spPr/>
+        <p:txBody>
+          <a:bodyPr/>
+          <a:lstStyle/>
+          <a:p>
+            <a:r>
+              <a:t>Quarterly Results</a:t>
+            </a:r>
+          </a:p>
+        </p:txBody>
+      </p:sp>
+      <p:sp>
+        <p:nvSpPr>
+          <p:cNvPr id="3" name="Subtitle 2"/>
+          <p:cNvSpPr>
+            <a:spLocks noGrp="1"/>
+          </p:cNvSpPr>
+          <p:nvPr>
+            <p:ph type="subTitle" idx="1"/>
+          </p:nvPr>
+        </p:nvSpPr>
+        <p:spPr/>
+        <p:txBody>
+          <a:bodyPr/>
+          <a:lstStyle/>
+          <a:p/>
+        </p:txBody>
+      </p:sp>
     </p:spTree>
   </p:cSld>
   <p:clrMapOvr>
@@ -3215,38 +3162,32 @@
           <a:lstStyle/>
           <a:p>
             <a:r>
-              <a:t>Yue Sai's Relevance Decline</a:t>
-            </a:r>
-          </a:p>
-        </p:txBody>
-      </p:sp>
-      <p:sp>
-        <p:nvSpPr>
-          <p:cNvPr id="3" name="TextBox 2"/>
-          <p:cNvSpPr txBox="1"/>
-          <p:nvPr/>
-        </p:nvSpPr>
-        <p:spPr>
-          <a:xfrm>
-            <a:off x="1097280" y="1554480"/>
-            <a:ext cx="4206240" cy="4206240"/>
-          </a:xfrm>
-          <a:prstGeom prst="rect">
-            <a:avLst/>
-          </a:prstGeom>
-          <a:noFill/>
-        </p:spPr>
-        <p:txBody>
-          <a:bodyPr wrap="square">
-            <a:spAutoFit/>
-          </a:bodyPr>
-          <a:lstStyle/>
+              <a:t>Q1 Highlights</a:t>
+            </a:r>
+          </a:p>
+        </p:txBody>
+      </p:sp>
+      <p:sp>
+        <p:nvSpPr>
+          <p:cNvPr id="3" name="Content Placeholder 2"/>
+          <p:cNvSpPr>
+            <a:spLocks noGrp="1"/>
+          </p:cNvSpPr>
+          <p:nvPr>
+            <p:ph idx="1"/>
+          </p:nvPr>
+        </p:nvSpPr>
+        <p:spPr/>
+        <p:txBody>
+          <a:bodyPr/>
+          <a:lstStyle/>
+          <a:p/>
           <a:p>
             <a:pPr>
               <a:defRPr sz="1800"/>
             </a:pPr>
             <a:r>
-              <a:t>• Multiple unsuccessful attempts to reposition the brand</a:t>
+              <a:t>Revenue up 30%</a:t>
             </a:r>
           </a:p>
           <a:p>
@@ -3254,22 +3195,103 @@
               <a:defRPr sz="1800"/>
             </a:pPr>
             <a:r>
-              <a:t>• Failing to adapt to changing consumer preferences</a:t>
-            </a:r>
-          </a:p>
+              <a:t>Holiday boost</a:t>
+            </a:r>
+          </a:p>
+        </p:txBody>
+      </p:sp>
+    </p:spTree>
+  </p:cSld>
+  <p:clrMapOvr>
+    <a:masterClrMapping/>
+  </p:clrMapOvr>
+</p:sld>
+</file>
+
+<file path=ppt/slides/slide3.xml><?xml version="1.0" encoding="utf-8"?>
+<p:sld xmlns:a="http://schemas.openxmlformats.org/drawingml/2006/main" xmlns:p="http://schemas.openxmlformats.org/presentationml/2006/main" xmlns:r="http://schemas.openxmlformats.org/officeDocument/2006/relationships">
+  <p:cSld>
+    <p:spTree>
+      <p:nvGrpSpPr>
+        <p:cNvPr id="1" name=""/>
+        <p:cNvGrpSpPr/>
+        <p:nvPr/>
+      </p:nvGrpSpPr>
+      <p:grpSpPr/>
+      <p:sp>
+        <p:nvSpPr>
+          <p:cNvPr id="2" name="Title 1"/>
+          <p:cNvSpPr>
+            <a:spLocks noGrp="1"/>
+          </p:cNvSpPr>
+          <p:nvPr>
+            <p:ph type="title"/>
+          </p:nvPr>
+        </p:nvSpPr>
+        <p:spPr/>
+        <p:txBody>
+          <a:bodyPr/>
+          <a:lstStyle/>
+          <a:p>
+            <a:r>
+              <a:t>Q2 Trends</a:t>
+            </a:r>
+          </a:p>
+        </p:txBody>
+      </p:sp>
+      <p:sp>
+        <p:nvSpPr>
+          <p:cNvPr id="3" name="Content Placeholder 2"/>
+          <p:cNvSpPr>
+            <a:spLocks noGrp="1"/>
+          </p:cNvSpPr>
+          <p:nvPr>
+            <p:ph idx="1" sz="half"/>
+          </p:nvPr>
+        </p:nvSpPr>
+        <p:spPr/>
+        <p:txBody>
+          <a:bodyPr/>
+          <a:lstStyle/>
+          <a:p/>
           <a:p>
             <a:pPr>
               <a:defRPr sz="1800"/>
             </a:pPr>
             <a:r>
-              <a:t>• Losing market share to competitors with more innovative strategies</a:t>
-            </a:r>
-          </a:p>
+              <a:t>Drop in retail demand</a:t>
+            </a:r>
+          </a:p>
+          <a:p>
+            <a:pPr>
+              <a:defRPr sz="1800"/>
+            </a:pPr>
+            <a:r>
+              <a:t>Inventory buildup</a:t>
+            </a:r>
+          </a:p>
+        </p:txBody>
+      </p:sp>
+      <p:sp>
+        <p:nvSpPr>
+          <p:cNvPr id="4" name="Content Placeholder 3"/>
+          <p:cNvSpPr>
+            <a:spLocks noGrp="1"/>
+          </p:cNvSpPr>
+          <p:nvPr>
+            <p:ph idx="2" sz="half"/>
+          </p:nvPr>
+        </p:nvSpPr>
+        <p:spPr/>
+        <p:txBody>
+          <a:bodyPr/>
+          <a:lstStyle/>
+          <a:p/>
         </p:txBody>
       </p:sp>
       <p:pic>
         <p:nvPicPr>
-          <p:cNvPr id="4" name="Picture 3" descr="img_p0_2.png"/>
+          <p:cNvPr id="5" name="Picture 4" descr="yue_sai_logo.png"/>
           <p:cNvPicPr>
             <a:picLocks noChangeAspect="1"/>
           </p:cNvPicPr>
@@ -3283,8 +3305,8 @@
         </p:blipFill>
         <p:spPr>
           <a:xfrm>
-            <a:off x="5212080" y="1554480"/>
-            <a:ext cx="3291840" cy="2377440"/>
+            <a:off x="4648200" y="1600200"/>
+            <a:ext cx="3657600" cy="3657600"/>
           </a:xfrm>
           <a:prstGeom prst="rect">
             <a:avLst/>

</xml_diff>